<commit_message>
Fixed code changes in slides
</commit_message>
<xml_diff>
--- a/slides/GithubActions-WorkflowsInYourRepo.pptx
+++ b/slides/GithubActions-WorkflowsInYourRepo.pptx
@@ -6170,11 +6170,8 @@
             <a:pPr lvl="1"/>
             <a:r>
               <a:rPr lang="en-US" dirty="0"/>
-              <a:t>Each step of the job is executed on the same runner to allow</a:t>
-            </a:r>
-          </a:p>
-          <a:p>
-            <a:endParaRPr lang="en-US" dirty="0"/>
+              <a:t>Each step of the job is executed on the same runner</a:t>
+            </a:r>
           </a:p>
         </p:txBody>
       </p:sp>
@@ -7833,7 +7830,7 @@
                 </a:highlight>
                 <a:latin typeface="Consolas" panose="020B0609020204030204" pitchFamily="49" charset="0"/>
               </a:rPr>
-              <a:t>    branches: [ master ]</a:t>
+              <a:t>    branches: [ main ]</a:t>
             </a:r>
           </a:p>
         </p:txBody>
@@ -7989,7 +7986,7 @@
                 </a:highlight>
                 <a:latin typeface="Consolas" panose="020B0609020204030204" pitchFamily="49" charset="0"/>
               </a:rPr>
-              <a:t>    branches: [ master ]</a:t>
+              <a:t>    branches: [ main ]</a:t>
             </a:r>
           </a:p>
           <a:p>
@@ -8173,7 +8170,7 @@
                 </a:highlight>
                 <a:latin typeface="Consolas" panose="020B0609020204030204" pitchFamily="49" charset="0"/>
               </a:rPr>
-              <a:t>    branches: [ master ]</a:t>
+              <a:t>    branches: [ main ]</a:t>
             </a:r>
           </a:p>
           <a:p>
@@ -9227,7 +9224,7 @@
                 </a:highlight>
                 <a:latin typeface="Consolas" panose="020B0609020204030204" pitchFamily="49" charset="0"/>
               </a:rPr>
-              <a:t>        app-name: ‘GitHubActions-PCC2021'</a:t>
+              <a:t>        app-name: ‘GitHubActionsPCC2021'</a:t>
             </a:r>
           </a:p>
           <a:p>

</xml_diff>